<commit_message>
Author :Ruchi Pareek Description :Changed deck
</commit_message>
<xml_diff>
--- a/Ruchi_Script.pptx
+++ b/Ruchi_Script.pptx
@@ -104,6 +104,11 @@
       </a:defRPr>
     </a:lvl9pPr>
   </p:defaultTextStyle>
+  <p:extLst>
+    <p:ext uri="{EFAFB233-063F-42B5-8137-9DF3F51BA10A}">
+      <p15:sldGuideLst xmlns:p15="http://schemas.microsoft.com/office/powerpoint/2012/main"/>
+    </p:ext>
+  </p:extLst>
 </p:presentation>
 </file>
 
@@ -238,7 +243,7 @@
           <a:p>
             <a:fld id="{9E7D97BD-360C-435C-9247-009D24420ABC}" type="datetimeFigureOut">
               <a:rPr lang="en-US" smtClean="0"/>
-              <a:t>10/21/2016</a:t>
+              <a:t>2/13/2017</a:t>
             </a:fld>
             <a:endParaRPr lang="en-US"/>
           </a:p>
@@ -408,7 +413,7 @@
           <a:p>
             <a:fld id="{9E7D97BD-360C-435C-9247-009D24420ABC}" type="datetimeFigureOut">
               <a:rPr lang="en-US" smtClean="0"/>
-              <a:t>10/21/2016</a:t>
+              <a:t>2/13/2017</a:t>
             </a:fld>
             <a:endParaRPr lang="en-US"/>
           </a:p>
@@ -588,7 +593,7 @@
           <a:p>
             <a:fld id="{9E7D97BD-360C-435C-9247-009D24420ABC}" type="datetimeFigureOut">
               <a:rPr lang="en-US" smtClean="0"/>
-              <a:t>10/21/2016</a:t>
+              <a:t>2/13/2017</a:t>
             </a:fld>
             <a:endParaRPr lang="en-US"/>
           </a:p>
@@ -758,7 +763,7 @@
           <a:p>
             <a:fld id="{9E7D97BD-360C-435C-9247-009D24420ABC}" type="datetimeFigureOut">
               <a:rPr lang="en-US" smtClean="0"/>
-              <a:t>10/21/2016</a:t>
+              <a:t>2/13/2017</a:t>
             </a:fld>
             <a:endParaRPr lang="en-US"/>
           </a:p>
@@ -1004,7 +1009,7 @@
           <a:p>
             <a:fld id="{9E7D97BD-360C-435C-9247-009D24420ABC}" type="datetimeFigureOut">
               <a:rPr lang="en-US" smtClean="0"/>
-              <a:t>10/21/2016</a:t>
+              <a:t>2/13/2017</a:t>
             </a:fld>
             <a:endParaRPr lang="en-US"/>
           </a:p>
@@ -1236,7 +1241,7 @@
           <a:p>
             <a:fld id="{9E7D97BD-360C-435C-9247-009D24420ABC}" type="datetimeFigureOut">
               <a:rPr lang="en-US" smtClean="0"/>
-              <a:t>10/21/2016</a:t>
+              <a:t>2/13/2017</a:t>
             </a:fld>
             <a:endParaRPr lang="en-US"/>
           </a:p>
@@ -1603,7 +1608,7 @@
           <a:p>
             <a:fld id="{9E7D97BD-360C-435C-9247-009D24420ABC}" type="datetimeFigureOut">
               <a:rPr lang="en-US" smtClean="0"/>
-              <a:t>10/21/2016</a:t>
+              <a:t>2/13/2017</a:t>
             </a:fld>
             <a:endParaRPr lang="en-US"/>
           </a:p>
@@ -1721,7 +1726,7 @@
           <a:p>
             <a:fld id="{9E7D97BD-360C-435C-9247-009D24420ABC}" type="datetimeFigureOut">
               <a:rPr lang="en-US" smtClean="0"/>
-              <a:t>10/21/2016</a:t>
+              <a:t>2/13/2017</a:t>
             </a:fld>
             <a:endParaRPr lang="en-US"/>
           </a:p>
@@ -1816,7 +1821,7 @@
           <a:p>
             <a:fld id="{9E7D97BD-360C-435C-9247-009D24420ABC}" type="datetimeFigureOut">
               <a:rPr lang="en-US" smtClean="0"/>
-              <a:t>10/21/2016</a:t>
+              <a:t>2/13/2017</a:t>
             </a:fld>
             <a:endParaRPr lang="en-US"/>
           </a:p>
@@ -2093,7 +2098,7 @@
           <a:p>
             <a:fld id="{9E7D97BD-360C-435C-9247-009D24420ABC}" type="datetimeFigureOut">
               <a:rPr lang="en-US" smtClean="0"/>
-              <a:t>10/21/2016</a:t>
+              <a:t>2/13/2017</a:t>
             </a:fld>
             <a:endParaRPr lang="en-US"/>
           </a:p>
@@ -2346,7 +2351,7 @@
           <a:p>
             <a:fld id="{9E7D97BD-360C-435C-9247-009D24420ABC}" type="datetimeFigureOut">
               <a:rPr lang="en-US" smtClean="0"/>
-              <a:t>10/21/2016</a:t>
+              <a:t>2/13/2017</a:t>
             </a:fld>
             <a:endParaRPr lang="en-US"/>
           </a:p>
@@ -2559,7 +2564,7 @@
           <a:p>
             <a:fld id="{9E7D97BD-360C-435C-9247-009D24420ABC}" type="datetimeFigureOut">
               <a:rPr lang="en-US" smtClean="0"/>
-              <a:t>10/21/2016</a:t>
+              <a:t>2/13/2017</a:t>
             </a:fld>
             <a:endParaRPr lang="en-US"/>
           </a:p>
@@ -2973,7 +2978,7 @@
         <p:spPr>
           <a:xfrm>
             <a:off x="900752" y="846161"/>
-            <a:ext cx="10658902" cy="369332"/>
+            <a:ext cx="10658902" cy="646331"/>
           </a:xfrm>
           <a:prstGeom prst="rect">
             <a:avLst/>
@@ -2991,8 +2996,34 @@
             </a:pPr>
             <a:r>
               <a:rPr lang="en-US" dirty="0" smtClean="0"/>
-              <a:t>Skill Gap introduce a new perspective </a:t>
-            </a:r>
+              <a:t>Skill Gap introduce a new </a:t>
+            </a:r>
+            <a:r>
+              <a:rPr lang="en-US" dirty="0" smtClean="0"/>
+              <a:t>perspective</a:t>
+            </a:r>
+          </a:p>
+          <a:p>
+            <a:pPr marL="342900" indent="-342900">
+              <a:buAutoNum type="arabicPeriod"/>
+            </a:pPr>
+            <a:r>
+              <a:rPr lang="en-US" dirty="0" smtClean="0"/>
+              <a:t>Editing script.pptx from </a:t>
+            </a:r>
+            <a:r>
+              <a:rPr lang="en-US" dirty="0" err="1" smtClean="0"/>
+              <a:t>Ruchi’s</a:t>
+            </a:r>
+            <a:r>
+              <a:rPr lang="en-US" smtClean="0"/>
+              <a:t> system</a:t>
+            </a:r>
+            <a:r>
+              <a:rPr lang="en-US" smtClean="0"/>
+              <a:t> </a:t>
+            </a:r>
+            <a:endParaRPr lang="en-US" dirty="0" smtClean="0"/>
           </a:p>
         </p:txBody>
       </p:sp>

</xml_diff>